<commit_message>
UI: Add documentation for showToast, applyUIChanges and Dashboard refresh (#9)
* Add documentation for showToast, applyUIChanges and Dashboard refresh

* Add min/max range. Improve applyUIChanges example

* Fix database credentials on local development docs

* Fix titles on APIClients documentation

* Fix numbering

* Remove runtime from behaviours doc
</commit_message>
<xml_diff>
--- a/docs/images/modeler/BehaviourLifecycle.pptx
+++ b/docs/images/modeler/BehaviourLifecycle.pptx
@@ -400,7 +400,7 @@
           <a:p>
             <a:fld id="{8F6B8F7E-561F-4D0C-80D5-A06481037D10}" type="datetimeFigureOut">
               <a:rPr lang="en-US" smtClean="0"/>
-              <a:t>2/1/2021</a:t>
+              <a:t>1/23/2024</a:t>
             </a:fld>
             <a:endParaRPr lang="en-US"/>
           </a:p>
@@ -598,7 +598,7 @@
           <a:p>
             <a:fld id="{8F6B8F7E-561F-4D0C-80D5-A06481037D10}" type="datetimeFigureOut">
               <a:rPr lang="en-US" smtClean="0"/>
-              <a:t>2/1/2021</a:t>
+              <a:t>1/23/2024</a:t>
             </a:fld>
             <a:endParaRPr lang="en-US"/>
           </a:p>
@@ -806,7 +806,7 @@
           <a:p>
             <a:fld id="{8F6B8F7E-561F-4D0C-80D5-A06481037D10}" type="datetimeFigureOut">
               <a:rPr lang="en-US" smtClean="0"/>
-              <a:t>2/1/2021</a:t>
+              <a:t>1/23/2024</a:t>
             </a:fld>
             <a:endParaRPr lang="en-US"/>
           </a:p>
@@ -1004,7 +1004,7 @@
           <a:p>
             <a:fld id="{8F6B8F7E-561F-4D0C-80D5-A06481037D10}" type="datetimeFigureOut">
               <a:rPr lang="en-US" smtClean="0"/>
-              <a:t>2/1/2021</a:t>
+              <a:t>1/23/2024</a:t>
             </a:fld>
             <a:endParaRPr lang="en-US"/>
           </a:p>
@@ -1279,7 +1279,7 @@
           <a:p>
             <a:fld id="{8F6B8F7E-561F-4D0C-80D5-A06481037D10}" type="datetimeFigureOut">
               <a:rPr lang="en-US" smtClean="0"/>
-              <a:t>2/1/2021</a:t>
+              <a:t>1/23/2024</a:t>
             </a:fld>
             <a:endParaRPr lang="en-US"/>
           </a:p>
@@ -1544,7 +1544,7 @@
           <a:p>
             <a:fld id="{8F6B8F7E-561F-4D0C-80D5-A06481037D10}" type="datetimeFigureOut">
               <a:rPr lang="en-US" smtClean="0"/>
-              <a:t>2/1/2021</a:t>
+              <a:t>1/23/2024</a:t>
             </a:fld>
             <a:endParaRPr lang="en-US"/>
           </a:p>
@@ -1956,7 +1956,7 @@
           <a:p>
             <a:fld id="{8F6B8F7E-561F-4D0C-80D5-A06481037D10}" type="datetimeFigureOut">
               <a:rPr lang="en-US" smtClean="0"/>
-              <a:t>2/1/2021</a:t>
+              <a:t>1/23/2024</a:t>
             </a:fld>
             <a:endParaRPr lang="en-US"/>
           </a:p>
@@ -2097,7 +2097,7 @@
           <a:p>
             <a:fld id="{8F6B8F7E-561F-4D0C-80D5-A06481037D10}" type="datetimeFigureOut">
               <a:rPr lang="en-US" smtClean="0"/>
-              <a:t>2/1/2021</a:t>
+              <a:t>1/23/2024</a:t>
             </a:fld>
             <a:endParaRPr lang="en-US"/>
           </a:p>
@@ -2210,7 +2210,7 @@
           <a:p>
             <a:fld id="{8F6B8F7E-561F-4D0C-80D5-A06481037D10}" type="datetimeFigureOut">
               <a:rPr lang="en-US" smtClean="0"/>
-              <a:t>2/1/2021</a:t>
+              <a:t>1/23/2024</a:t>
             </a:fld>
             <a:endParaRPr lang="en-US"/>
           </a:p>
@@ -2521,7 +2521,7 @@
           <a:p>
             <a:fld id="{8F6B8F7E-561F-4D0C-80D5-A06481037D10}" type="datetimeFigureOut">
               <a:rPr lang="en-US" smtClean="0"/>
-              <a:t>2/1/2021</a:t>
+              <a:t>1/23/2024</a:t>
             </a:fld>
             <a:endParaRPr lang="en-US"/>
           </a:p>
@@ -2809,7 +2809,7 @@
           <a:p>
             <a:fld id="{8F6B8F7E-561F-4D0C-80D5-A06481037D10}" type="datetimeFigureOut">
               <a:rPr lang="en-US" smtClean="0"/>
-              <a:t>2/1/2021</a:t>
+              <a:t>1/23/2024</a:t>
             </a:fld>
             <a:endParaRPr lang="en-US"/>
           </a:p>
@@ -3050,7 +3050,7 @@
           <a:p>
             <a:fld id="{8F6B8F7E-561F-4D0C-80D5-A06481037D10}" type="datetimeFigureOut">
               <a:rPr lang="en-US" smtClean="0"/>
-              <a:t>2/1/2021</a:t>
+              <a:t>1/23/2024</a:t>
             </a:fld>
             <a:endParaRPr lang="en-US"/>
           </a:p>
@@ -3768,54 +3768,6 @@
       </p:sp>
       <p:sp>
         <p:nvSpPr>
-          <p:cNvPr id="11" name="Rectangle 10">
-            <a:extLst>
-              <a:ext uri="{FF2B5EF4-FFF2-40B4-BE49-F238E27FC236}">
-                <a16:creationId xmlns:a16="http://schemas.microsoft.com/office/drawing/2014/main" id="{6D50C63C-A87A-4030-B14B-1F6FDC27C91A}"/>
-              </a:ext>
-            </a:extLst>
-          </p:cNvPr>
-          <p:cNvSpPr/>
-          <p:nvPr/>
-        </p:nvSpPr>
-        <p:spPr>
-          <a:xfrm>
-            <a:off x="1591405" y="4594215"/>
-            <a:ext cx="2558561" cy="474785"/>
-          </a:xfrm>
-          <a:prstGeom prst="rect">
-            <a:avLst/>
-          </a:prstGeom>
-          <a:ln/>
-        </p:spPr>
-        <p:style>
-          <a:lnRef idx="3">
-            <a:schemeClr val="lt1"/>
-          </a:lnRef>
-          <a:fillRef idx="1">
-            <a:schemeClr val="accent2"/>
-          </a:fillRef>
-          <a:effectRef idx="1">
-            <a:schemeClr val="accent2"/>
-          </a:effectRef>
-          <a:fontRef idx="minor">
-            <a:schemeClr val="lt1"/>
-          </a:fontRef>
-        </p:style>
-        <p:txBody>
-          <a:bodyPr rtlCol="0" anchor="ctr"/>
-          <a:lstStyle/>
-          <a:p>
-            <a:pPr algn="ctr"/>
-            <a:r>
-              <a:rPr lang="en-US" sz="1400" dirty="0"/>
-              <a:t>Before Collection Entity Initialize</a:t>
-            </a:r>
-          </a:p>
-        </p:txBody>
-      </p:sp>
-      <p:sp>
-        <p:nvSpPr>
           <p:cNvPr id="12" name="Arrow: Down 11">
             <a:extLst>
               <a:ext uri="{FF2B5EF4-FFF2-40B4-BE49-F238E27FC236}">
@@ -4024,7 +3976,7 @@
         </p:nvSpPr>
         <p:spPr>
           <a:xfrm>
-            <a:off x="1591404" y="5136906"/>
+            <a:off x="1591406" y="4605757"/>
             <a:ext cx="2558561" cy="474785"/>
           </a:xfrm>
           <a:prstGeom prst="rect">

</xml_diff>